<commit_message>
ppt deer zasvar hiiged oruulaa
</commit_message>
<xml_diff>
--- a/өгэгжу.pptx
+++ b/өгэгжу.pptx
@@ -4072,7 +4072,7 @@
         <p:spPr>
           <a:xfrm>
             <a:off x="1512916" y="972589"/>
-            <a:ext cx="7697586" cy="830997"/>
+            <a:ext cx="7697586" cy="2308324"/>
           </a:xfrm>
           <a:prstGeom prst="rect">
             <a:avLst/>
@@ -4087,7 +4087,41 @@
           <a:p>
             <a:r>
               <a:rPr lang="mn-MN" sz="4800" dirty="0"/>
-              <a:t>Гоё тест хийж байнаа </a:t>
+              <a:t>Гоё тест хийж байнаа</a:t>
+            </a:r>
+            <a:endParaRPr lang="en-US" sz="4800" dirty="0"/>
+          </a:p>
+          <a:p>
+            <a:endParaRPr lang="en-US" sz="4800" dirty="0"/>
+          </a:p>
+          <a:p>
+            <a:r>
+              <a:rPr lang="en-US" sz="4800" dirty="0"/>
+              <a:t>Shine </a:t>
+            </a:r>
+            <a:r>
+              <a:rPr lang="en-US" sz="4800" dirty="0" err="1"/>
+              <a:t>turshilt</a:t>
+            </a:r>
+            <a:r>
+              <a:rPr lang="en-US" sz="4800" dirty="0"/>
+              <a:t> </a:t>
+            </a:r>
+            <a:r>
+              <a:rPr lang="en-US" sz="4800" dirty="0" err="1"/>
+              <a:t>hiij</a:t>
+            </a:r>
+            <a:r>
+              <a:rPr lang="en-US" sz="4800" dirty="0"/>
+              <a:t> </a:t>
+            </a:r>
+            <a:r>
+              <a:rPr lang="en-US" sz="4800"/>
+              <a:t>bna</a:t>
+            </a:r>
+            <a:r>
+              <a:rPr lang="mn-MN" sz="4800"/>
+              <a:t> </a:t>
             </a:r>
             <a:endParaRPr lang="en-US" sz="4800" dirty="0"/>
           </a:p>

</xml_diff>